<commit_message>
Update Dapr sequence diagram
</commit_message>
<xml_diff>
--- a/Figures.pptx
+++ b/Figures.pptx
@@ -23846,8 +23846,8 @@
         </p:nvSpPr>
         <p:spPr>
           <a:xfrm>
-            <a:off x="203920" y="361816"/>
-            <a:ext cx="11784159" cy="6134367"/>
+            <a:off x="428492" y="361816"/>
+            <a:ext cx="11335015" cy="6134367"/>
           </a:xfrm>
           <a:prstGeom prst="rect">
             <a:avLst/>
@@ -23898,7 +23898,7 @@
         </p:nvSpPr>
         <p:spPr>
           <a:xfrm>
-            <a:off x="7861195" y="5275570"/>
+            <a:off x="8085766" y="5275570"/>
             <a:ext cx="1420582" cy="230832"/>
           </a:xfrm>
           <a:prstGeom prst="rect">
@@ -24028,7 +24028,7 @@
         </p:nvSpPr>
         <p:spPr>
           <a:xfrm>
-            <a:off x="486680" y="474644"/>
+            <a:off x="711251" y="474644"/>
             <a:ext cx="1099991" cy="1270301"/>
           </a:xfrm>
           <a:prstGeom prst="roundRect">
@@ -24158,7 +24158,7 @@
         </p:nvSpPr>
         <p:spPr>
           <a:xfrm>
-            <a:off x="7268213" y="474644"/>
+            <a:off x="7492784" y="474644"/>
             <a:ext cx="1185965" cy="1270301"/>
           </a:xfrm>
           <a:prstGeom prst="roundRect">
@@ -24288,7 +24288,7 @@
         </p:nvSpPr>
         <p:spPr>
           <a:xfrm>
-            <a:off x="8933152" y="474644"/>
+            <a:off x="8956900" y="474644"/>
             <a:ext cx="1185965" cy="1270301"/>
           </a:xfrm>
           <a:prstGeom prst="roundRect">
@@ -24452,7 +24452,7 @@
         </p:nvSpPr>
         <p:spPr>
           <a:xfrm>
-            <a:off x="3082517" y="474644"/>
+            <a:off x="3307088" y="474644"/>
             <a:ext cx="2033390" cy="1270301"/>
           </a:xfrm>
           <a:prstGeom prst="roundRect">
@@ -24585,7 +24585,7 @@
         </p:nvSpPr>
         <p:spPr>
           <a:xfrm>
-            <a:off x="3188081" y="880936"/>
+            <a:off x="3412652" y="880936"/>
             <a:ext cx="748733" cy="748733"/>
           </a:xfrm>
           <a:prstGeom prst="ellipse">
@@ -24702,7 +24702,7 @@
         </p:nvSpPr>
         <p:spPr>
           <a:xfrm>
-            <a:off x="9182324" y="880936"/>
+            <a:off x="9206072" y="880936"/>
             <a:ext cx="748733" cy="748733"/>
           </a:xfrm>
           <a:prstGeom prst="ellipse">
@@ -24821,7 +24821,7 @@
         </p:nvSpPr>
         <p:spPr>
           <a:xfrm>
-            <a:off x="7527307" y="880936"/>
+            <a:off x="7751878" y="880936"/>
             <a:ext cx="748733" cy="748733"/>
           </a:xfrm>
           <a:prstGeom prst="ellipse">
@@ -24940,7 +24940,7 @@
         </p:nvSpPr>
         <p:spPr>
           <a:xfrm>
-            <a:off x="4195512" y="880936"/>
+            <a:off x="4420083" y="880936"/>
             <a:ext cx="748733" cy="748733"/>
           </a:xfrm>
           <a:prstGeom prst="ellipse">
@@ -25057,7 +25057,7 @@
         </p:nvSpPr>
         <p:spPr>
           <a:xfrm>
-            <a:off x="653064" y="880936"/>
+            <a:off x="877635" y="880936"/>
             <a:ext cx="748733" cy="748733"/>
           </a:xfrm>
           <a:prstGeom prst="ellipse">
@@ -25188,7 +25188,7 @@
         </p:nvCxnSpPr>
         <p:spPr>
           <a:xfrm>
-            <a:off x="1027431" y="1629669"/>
+            <a:off x="1252002" y="1629669"/>
             <a:ext cx="0" cy="4720196"/>
           </a:xfrm>
           <a:prstGeom prst="line">
@@ -25231,7 +25231,7 @@
         </p:nvCxnSpPr>
         <p:spPr>
           <a:xfrm>
-            <a:off x="1042588" y="2110455"/>
+            <a:off x="1267159" y="2110455"/>
             <a:ext cx="1244246" cy="0"/>
           </a:xfrm>
           <a:prstGeom prst="straightConnector1">
@@ -25270,7 +25270,7 @@
         </p:nvSpPr>
         <p:spPr>
           <a:xfrm>
-            <a:off x="1167168" y="1895064"/>
+            <a:off x="1391739" y="1895064"/>
             <a:ext cx="1031051" cy="230832"/>
           </a:xfrm>
           <a:prstGeom prst="rect">
@@ -25351,7 +25351,7 @@
         </p:nvCxnSpPr>
         <p:spPr>
           <a:xfrm>
-            <a:off x="3562447" y="1629669"/>
+            <a:off x="3787018" y="1629669"/>
             <a:ext cx="0" cy="4731452"/>
           </a:xfrm>
           <a:prstGeom prst="line">
@@ -25395,7 +25395,7 @@
         </p:nvCxnSpPr>
         <p:spPr>
           <a:xfrm flipH="1">
-            <a:off x="9529666" y="1629669"/>
+            <a:off x="9553414" y="1629669"/>
             <a:ext cx="27025" cy="4742706"/>
           </a:xfrm>
           <a:prstGeom prst="line">
@@ -25438,7 +25438,7 @@
         </p:nvCxnSpPr>
         <p:spPr>
           <a:xfrm>
-            <a:off x="4573026" y="1629669"/>
+            <a:off x="4797597" y="1629669"/>
             <a:ext cx="0" cy="4715151"/>
           </a:xfrm>
           <a:prstGeom prst="line">
@@ -25482,7 +25482,7 @@
         </p:nvCxnSpPr>
         <p:spPr>
           <a:xfrm>
-            <a:off x="7901675" y="1629669"/>
+            <a:off x="8126246" y="1629669"/>
             <a:ext cx="0" cy="4715151"/>
           </a:xfrm>
           <a:prstGeom prst="line">
@@ -25523,7 +25523,7 @@
         </p:nvSpPr>
         <p:spPr>
           <a:xfrm>
-            <a:off x="4720312" y="4208847"/>
+            <a:off x="4944883" y="4208847"/>
             <a:ext cx="1116011" cy="230832"/>
           </a:xfrm>
           <a:prstGeom prst="rect">
@@ -25641,7 +25641,7 @@
         </p:nvCxnSpPr>
         <p:spPr>
           <a:xfrm>
-            <a:off x="1042588" y="2908827"/>
+            <a:off x="1267159" y="2908827"/>
             <a:ext cx="1244246" cy="0"/>
           </a:xfrm>
           <a:prstGeom prst="straightConnector1">
@@ -25680,7 +25680,7 @@
         </p:nvSpPr>
         <p:spPr>
           <a:xfrm>
-            <a:off x="1167168" y="2693435"/>
+            <a:off x="1391739" y="2693435"/>
             <a:ext cx="1031051" cy="230832"/>
           </a:xfrm>
           <a:prstGeom prst="rect">
@@ -25761,8 +25761,8 @@
         </p:nvCxnSpPr>
         <p:spPr>
           <a:xfrm>
-            <a:off x="7903133" y="5468245"/>
-            <a:ext cx="1628415" cy="0"/>
+            <a:off x="8127704" y="5468245"/>
+            <a:ext cx="1425710" cy="0"/>
           </a:xfrm>
           <a:prstGeom prst="straightConnector1">
             <a:avLst/>
@@ -25802,8 +25802,8 @@
         </p:nvCxnSpPr>
         <p:spPr>
           <a:xfrm>
-            <a:off x="7908166" y="5599071"/>
-            <a:ext cx="1623383" cy="0"/>
+            <a:off x="8132737" y="5599071"/>
+            <a:ext cx="1420677" cy="0"/>
           </a:xfrm>
           <a:prstGeom prst="straightConnector1">
             <a:avLst/>
@@ -25843,7 +25843,7 @@
         </p:nvSpPr>
         <p:spPr>
           <a:xfrm>
-            <a:off x="5487395" y="880936"/>
+            <a:off x="5711966" y="880936"/>
             <a:ext cx="748733" cy="748733"/>
           </a:xfrm>
           <a:prstGeom prst="ellipse">
@@ -25932,7 +25932,7 @@
         </p:nvCxnSpPr>
         <p:spPr>
           <a:xfrm>
-            <a:off x="5861762" y="1629669"/>
+            <a:off x="6086333" y="1629669"/>
             <a:ext cx="0" cy="4715151"/>
           </a:xfrm>
           <a:prstGeom prst="line">
@@ -25975,7 +25975,7 @@
         </p:nvCxnSpPr>
         <p:spPr>
           <a:xfrm>
-            <a:off x="3562447" y="2551703"/>
+            <a:off x="3787018" y="2551703"/>
             <a:ext cx="2292787" cy="0"/>
           </a:xfrm>
           <a:prstGeom prst="straightConnector1">
@@ -26014,7 +26014,7 @@
         </p:nvSpPr>
         <p:spPr>
           <a:xfrm>
-            <a:off x="3537569" y="2319772"/>
+            <a:off x="3762140" y="2319772"/>
             <a:ext cx="1047082" cy="230832"/>
           </a:xfrm>
           <a:prstGeom prst="rect">
@@ -26110,7 +26110,7 @@
         </p:nvGrpSpPr>
         <p:grpSpPr>
           <a:xfrm>
-            <a:off x="1055088" y="1959261"/>
+            <a:off x="1279659" y="1959261"/>
             <a:ext cx="144135" cy="102007"/>
             <a:chOff x="10585174" y="1490390"/>
             <a:chExt cx="407492" cy="286109"/>
@@ -26302,7 +26302,7 @@
         </p:nvCxnSpPr>
         <p:spPr>
           <a:xfrm>
-            <a:off x="4590906" y="3579085"/>
+            <a:off x="4815477" y="3579085"/>
             <a:ext cx="1264328" cy="0"/>
           </a:xfrm>
           <a:prstGeom prst="straightConnector1">
@@ -26341,7 +26341,7 @@
         </p:nvSpPr>
         <p:spPr>
           <a:xfrm>
-            <a:off x="4549489" y="3371963"/>
+            <a:off x="4774060" y="3371963"/>
             <a:ext cx="965329" cy="230832"/>
           </a:xfrm>
           <a:prstGeom prst="rect">
@@ -26439,7 +26439,7 @@
         </p:nvCxnSpPr>
         <p:spPr>
           <a:xfrm>
-            <a:off x="4579219" y="3710830"/>
+            <a:off x="4803790" y="3710830"/>
             <a:ext cx="1276016" cy="0"/>
           </a:xfrm>
           <a:prstGeom prst="straightConnector1">
@@ -26482,7 +26482,7 @@
         </p:nvCxnSpPr>
         <p:spPr>
           <a:xfrm flipH="1">
-            <a:off x="4579220" y="4563584"/>
+            <a:off x="4803791" y="4563584"/>
             <a:ext cx="2120412" cy="0"/>
           </a:xfrm>
           <a:prstGeom prst="straightConnector1">
@@ -26522,7 +26522,7 @@
         </p:nvSpPr>
         <p:spPr>
           <a:xfrm>
-            <a:off x="4714712" y="4356462"/>
+            <a:off x="4939283" y="4356462"/>
             <a:ext cx="1040670" cy="230832"/>
           </a:xfrm>
           <a:prstGeom prst="rect">
@@ -26601,7 +26601,7 @@
         </p:nvGrpSpPr>
         <p:grpSpPr>
           <a:xfrm>
-            <a:off x="1063896" y="2760660"/>
+            <a:off x="1288467" y="2760660"/>
             <a:ext cx="144135" cy="102007"/>
             <a:chOff x="10585174" y="1490390"/>
             <a:chExt cx="407492" cy="286109"/>
@@ -26791,7 +26791,7 @@
         </p:nvGrpSpPr>
         <p:grpSpPr>
           <a:xfrm>
-            <a:off x="4579223" y="3895422"/>
+            <a:off x="4803794" y="3895422"/>
             <a:ext cx="265229" cy="229774"/>
             <a:chOff x="4738943" y="4803764"/>
             <a:chExt cx="361377" cy="259267"/>
@@ -26938,7 +26938,7 @@
         </p:nvSpPr>
         <p:spPr>
           <a:xfrm>
-            <a:off x="4808000" y="3808906"/>
+            <a:off x="5032571" y="3808906"/>
             <a:ext cx="1050288" cy="369332"/>
           </a:xfrm>
           <a:prstGeom prst="rect">
@@ -27087,7 +27087,7 @@
         </p:nvGrpSpPr>
         <p:grpSpPr>
           <a:xfrm>
-            <a:off x="7907125" y="4919201"/>
+            <a:off x="8131696" y="4919201"/>
             <a:ext cx="265229" cy="229774"/>
             <a:chOff x="4738943" y="4803764"/>
             <a:chExt cx="361377" cy="259267"/>
@@ -27234,7 +27234,7 @@
         </p:nvSpPr>
         <p:spPr>
           <a:xfrm>
-            <a:off x="8112476" y="4921785"/>
+            <a:off x="8337047" y="4921785"/>
             <a:ext cx="838691" cy="230832"/>
           </a:xfrm>
           <a:prstGeom prst="rect">
@@ -27318,7 +27318,7 @@
         </p:nvCxnSpPr>
         <p:spPr>
           <a:xfrm>
-            <a:off x="7899724" y="5956490"/>
+            <a:off x="8124295" y="5956490"/>
             <a:ext cx="2662877" cy="0"/>
           </a:xfrm>
           <a:prstGeom prst="straightConnector1">
@@ -27357,7 +27357,7 @@
         </p:nvSpPr>
         <p:spPr>
           <a:xfrm>
-            <a:off x="7893037" y="5731458"/>
+            <a:off x="8117608" y="5731458"/>
             <a:ext cx="853119" cy="230832"/>
           </a:xfrm>
           <a:prstGeom prst="rect">
@@ -27436,7 +27436,7 @@
         </p:nvSpPr>
         <p:spPr>
           <a:xfrm>
-            <a:off x="1912467" y="880936"/>
+            <a:off x="2137038" y="880936"/>
             <a:ext cx="748733" cy="748733"/>
           </a:xfrm>
           <a:prstGeom prst="ellipse">
@@ -27531,7 +27531,7 @@
         </p:nvCxnSpPr>
         <p:spPr>
           <a:xfrm>
-            <a:off x="2286834" y="1629669"/>
+            <a:off x="2511405" y="1629669"/>
             <a:ext cx="0" cy="4731451"/>
           </a:xfrm>
           <a:prstGeom prst="line">
@@ -27574,7 +27574,7 @@
         </p:nvCxnSpPr>
         <p:spPr>
           <a:xfrm>
-            <a:off x="2286834" y="2348626"/>
+            <a:off x="2511405" y="2348626"/>
             <a:ext cx="1275614" cy="0"/>
           </a:xfrm>
           <a:prstGeom prst="straightConnector1">
@@ -27614,7 +27614,7 @@
         </p:nvSpPr>
         <p:spPr>
           <a:xfrm>
-            <a:off x="2437396" y="2148403"/>
+            <a:off x="2661967" y="2148403"/>
             <a:ext cx="1031051" cy="230832"/>
           </a:xfrm>
           <a:prstGeom prst="rect">
@@ -27693,7 +27693,7 @@
         </p:nvGrpSpPr>
         <p:grpSpPr>
           <a:xfrm>
-            <a:off x="2335106" y="2212601"/>
+            <a:off x="2559677" y="2212601"/>
             <a:ext cx="144135" cy="102007"/>
             <a:chOff x="10585174" y="1490390"/>
             <a:chExt cx="407492" cy="286109"/>
@@ -27885,7 +27885,7 @@
         </p:nvCxnSpPr>
         <p:spPr>
           <a:xfrm>
-            <a:off x="2286834" y="3213261"/>
+            <a:off x="2511405" y="3213261"/>
             <a:ext cx="2259316" cy="0"/>
           </a:xfrm>
           <a:prstGeom prst="straightConnector1">
@@ -27925,7 +27925,7 @@
         </p:nvSpPr>
         <p:spPr>
           <a:xfrm>
-            <a:off x="2458394" y="3013038"/>
+            <a:off x="2682965" y="3013038"/>
             <a:ext cx="1031051" cy="230832"/>
           </a:xfrm>
           <a:prstGeom prst="rect">
@@ -28004,7 +28004,7 @@
         </p:nvGrpSpPr>
         <p:grpSpPr>
           <a:xfrm>
-            <a:off x="2337064" y="3077236"/>
+            <a:off x="2561635" y="3077236"/>
             <a:ext cx="144135" cy="102007"/>
             <a:chOff x="10585174" y="1490390"/>
             <a:chExt cx="407492" cy="286109"/>
@@ -28194,7 +28194,7 @@
         </p:nvGrpSpPr>
         <p:grpSpPr>
           <a:xfrm>
-            <a:off x="4612004" y="4419820"/>
+            <a:off x="4836575" y="4419820"/>
             <a:ext cx="144135" cy="102007"/>
             <a:chOff x="10585174" y="1490390"/>
             <a:chExt cx="407492" cy="286109"/>
@@ -28386,7 +28386,7 @@
         </p:nvCxnSpPr>
         <p:spPr>
           <a:xfrm flipH="1">
-            <a:off x="6707457" y="4822048"/>
+            <a:off x="6932028" y="4822048"/>
             <a:ext cx="1192265" cy="0"/>
           </a:xfrm>
           <a:prstGeom prst="straightConnector1">
@@ -28426,7 +28426,7 @@
         </p:nvSpPr>
         <p:spPr>
           <a:xfrm>
-            <a:off x="6843976" y="4590117"/>
+            <a:off x="7068547" y="4590117"/>
             <a:ext cx="1040670" cy="230832"/>
           </a:xfrm>
           <a:prstGeom prst="rect">
@@ -28505,7 +28505,7 @@
         </p:nvGrpSpPr>
         <p:grpSpPr>
           <a:xfrm>
-            <a:off x="6741268" y="4653476"/>
+            <a:off x="6965839" y="4653476"/>
             <a:ext cx="144135" cy="102007"/>
             <a:chOff x="10585174" y="1490390"/>
             <a:chExt cx="407492" cy="286109"/>
@@ -28695,7 +28695,7 @@
         </p:nvSpPr>
         <p:spPr>
           <a:xfrm>
-            <a:off x="6325266" y="880936"/>
+            <a:off x="6549837" y="880936"/>
             <a:ext cx="748733" cy="748733"/>
           </a:xfrm>
           <a:prstGeom prst="ellipse">
@@ -28798,7 +28798,7 @@
         </p:nvCxnSpPr>
         <p:spPr>
           <a:xfrm>
-            <a:off x="6699633" y="1629669"/>
+            <a:off x="6924204" y="1629669"/>
             <a:ext cx="0" cy="4715151"/>
           </a:xfrm>
           <a:prstGeom prst="line">
@@ -28856,7 +28856,7 @@
         </p:blipFill>
         <p:spPr>
           <a:xfrm>
-            <a:off x="5707049" y="1056730"/>
+            <a:off x="5931620" y="1056730"/>
             <a:ext cx="287045" cy="246629"/>
           </a:xfrm>
           <a:prstGeom prst="rect">
@@ -28892,7 +28892,7 @@
         </p:blipFill>
         <p:spPr>
           <a:xfrm>
-            <a:off x="2123184" y="1076605"/>
+            <a:off x="2347755" y="1076605"/>
             <a:ext cx="319133" cy="236123"/>
           </a:xfrm>
           <a:prstGeom prst="rect">
@@ -28928,7 +28928,7 @@
         </p:blipFill>
         <p:spPr>
           <a:xfrm>
-            <a:off x="6597847" y="1062504"/>
+            <a:off x="6822418" y="1062504"/>
             <a:ext cx="236104" cy="249876"/>
           </a:xfrm>
           <a:prstGeom prst="rect">
@@ -28950,7 +28950,7 @@
         </p:nvSpPr>
         <p:spPr>
           <a:xfrm>
-            <a:off x="10213377" y="880936"/>
+            <a:off x="10237125" y="880936"/>
             <a:ext cx="748733" cy="748733"/>
           </a:xfrm>
           <a:prstGeom prst="ellipse">
@@ -29039,7 +29039,7 @@
         </p:nvCxnSpPr>
         <p:spPr>
           <a:xfrm flipH="1">
-            <a:off x="10560847" y="1629669"/>
+            <a:off x="10584595" y="1629669"/>
             <a:ext cx="26897" cy="4720195"/>
           </a:xfrm>
           <a:prstGeom prst="line">
@@ -29080,7 +29080,7 @@
         </p:nvSpPr>
         <p:spPr>
           <a:xfrm>
-            <a:off x="766020" y="2122576"/>
+            <a:off x="990591" y="2122576"/>
             <a:ext cx="175899" cy="786249"/>
           </a:xfrm>
           <a:prstGeom prst="leftBrace">
@@ -29127,7 +29127,7 @@
         </p:nvSpPr>
         <p:spPr>
           <a:xfrm>
-            <a:off x="203920" y="2288218"/>
+            <a:off x="428491" y="2288218"/>
             <a:ext cx="577402" cy="369332"/>
           </a:xfrm>
           <a:prstGeom prst="rect">
@@ -29236,8 +29236,8 @@
         </p:nvCxnSpPr>
         <p:spPr>
           <a:xfrm>
-            <a:off x="10564743" y="6181520"/>
-            <a:ext cx="804296" cy="0"/>
+            <a:off x="10588491" y="6257021"/>
+            <a:ext cx="650119" cy="0"/>
           </a:xfrm>
           <a:prstGeom prst="straightConnector1">
             <a:avLst/>
@@ -29275,8 +29275,8 @@
         </p:nvSpPr>
         <p:spPr>
           <a:xfrm>
-            <a:off x="10525910" y="5989704"/>
-            <a:ext cx="700833" cy="230832"/>
+            <a:off x="10537776" y="6037761"/>
+            <a:ext cx="700834" cy="230832"/>
           </a:xfrm>
           <a:prstGeom prst="rect">
             <a:avLst/>
@@ -29338,7 +29338,7 @@
                 <a:ea typeface="+mn-ea"/>
                 <a:cs typeface="+mn-cs"/>
               </a:rPr>
-              <a:t> Email</a:t>
+              <a:t> email</a:t>
             </a:r>
           </a:p>
         </p:txBody>
@@ -29357,8 +29357,8 @@
         </p:nvSpPr>
         <p:spPr>
           <a:xfrm>
-            <a:off x="11368629" y="5979329"/>
-            <a:ext cx="504594" cy="365489"/>
+            <a:off x="11240825" y="6098796"/>
+            <a:ext cx="404654" cy="293100"/>
           </a:xfrm>
           <a:prstGeom prst="cloud">
             <a:avLst/>

</xml_diff>

<commit_message>
Describe actor implementation in README
</commit_message>
<xml_diff>
--- a/Figures.pptx
+++ b/Figures.pptx
@@ -202,7 +202,7 @@
           <a:p>
             <a:fld id="{FBE30875-4028-481A-8091-6EDB19798FA1}" type="datetimeFigureOut">
               <a:rPr lang="en-NL" smtClean="0"/>
-              <a:t>01/03/2021</a:t>
+              <a:t>09/03/2021</a:t>
             </a:fld>
             <a:endParaRPr lang="en-NL"/>
           </a:p>
@@ -907,7 +907,7 @@
           <a:p>
             <a:fld id="{766785BB-7706-4DEE-A3EF-8F6193F80700}" type="datetimeFigureOut">
               <a:rPr lang="en-NL" smtClean="0"/>
-              <a:t>01/03/2021</a:t>
+              <a:t>09/03/2021</a:t>
             </a:fld>
             <a:endParaRPr lang="en-NL"/>
           </a:p>
@@ -1107,7 +1107,7 @@
           <a:p>
             <a:fld id="{766785BB-7706-4DEE-A3EF-8F6193F80700}" type="datetimeFigureOut">
               <a:rPr lang="en-NL" smtClean="0"/>
-              <a:t>01/03/2021</a:t>
+              <a:t>09/03/2021</a:t>
             </a:fld>
             <a:endParaRPr lang="en-NL"/>
           </a:p>
@@ -1317,7 +1317,7 @@
           <a:p>
             <a:fld id="{766785BB-7706-4DEE-A3EF-8F6193F80700}" type="datetimeFigureOut">
               <a:rPr lang="en-NL" smtClean="0"/>
-              <a:t>01/03/2021</a:t>
+              <a:t>09/03/2021</a:t>
             </a:fld>
             <a:endParaRPr lang="en-NL"/>
           </a:p>
@@ -1539,7 +1539,7 @@
           <a:p>
             <a:fld id="{705B85CB-7326-4CDB-B6DC-66899E5F8844}" type="datetimeFigureOut">
               <a:rPr lang="nl-NL" smtClean="0"/>
-              <a:t>1-3-2021</a:t>
+              <a:t>9-3-2021</a:t>
             </a:fld>
             <a:endParaRPr lang="nl-NL"/>
           </a:p>
@@ -1739,7 +1739,7 @@
           <a:p>
             <a:fld id="{705B85CB-7326-4CDB-B6DC-66899E5F8844}" type="datetimeFigureOut">
               <a:rPr lang="nl-NL" smtClean="0"/>
-              <a:t>1-3-2021</a:t>
+              <a:t>9-3-2021</a:t>
             </a:fld>
             <a:endParaRPr lang="nl-NL"/>
           </a:p>
@@ -2015,7 +2015,7 @@
           <a:p>
             <a:fld id="{705B85CB-7326-4CDB-B6DC-66899E5F8844}" type="datetimeFigureOut">
               <a:rPr lang="nl-NL" smtClean="0"/>
-              <a:t>1-3-2021</a:t>
+              <a:t>9-3-2021</a:t>
             </a:fld>
             <a:endParaRPr lang="nl-NL"/>
           </a:p>
@@ -2283,7 +2283,7 @@
           <a:p>
             <a:fld id="{705B85CB-7326-4CDB-B6DC-66899E5F8844}" type="datetimeFigureOut">
               <a:rPr lang="nl-NL" smtClean="0"/>
-              <a:t>1-3-2021</a:t>
+              <a:t>9-3-2021</a:t>
             </a:fld>
             <a:endParaRPr lang="nl-NL"/>
           </a:p>
@@ -2698,7 +2698,7 @@
           <a:p>
             <a:fld id="{705B85CB-7326-4CDB-B6DC-66899E5F8844}" type="datetimeFigureOut">
               <a:rPr lang="nl-NL" smtClean="0"/>
-              <a:t>1-3-2021</a:t>
+              <a:t>9-3-2021</a:t>
             </a:fld>
             <a:endParaRPr lang="nl-NL"/>
           </a:p>
@@ -2840,7 +2840,7 @@
           <a:p>
             <a:fld id="{705B85CB-7326-4CDB-B6DC-66899E5F8844}" type="datetimeFigureOut">
               <a:rPr lang="nl-NL" smtClean="0"/>
-              <a:t>1-3-2021</a:t>
+              <a:t>9-3-2021</a:t>
             </a:fld>
             <a:endParaRPr lang="nl-NL"/>
           </a:p>
@@ -2953,7 +2953,7 @@
           <a:p>
             <a:fld id="{705B85CB-7326-4CDB-B6DC-66899E5F8844}" type="datetimeFigureOut">
               <a:rPr lang="nl-NL" smtClean="0"/>
-              <a:t>1-3-2021</a:t>
+              <a:t>9-3-2021</a:t>
             </a:fld>
             <a:endParaRPr lang="nl-NL"/>
           </a:p>
@@ -3266,7 +3266,7 @@
           <a:p>
             <a:fld id="{705B85CB-7326-4CDB-B6DC-66899E5F8844}" type="datetimeFigureOut">
               <a:rPr lang="nl-NL" smtClean="0"/>
-              <a:t>1-3-2021</a:t>
+              <a:t>9-3-2021</a:t>
             </a:fld>
             <a:endParaRPr lang="nl-NL"/>
           </a:p>
@@ -3466,7 +3466,7 @@
           <a:p>
             <a:fld id="{766785BB-7706-4DEE-A3EF-8F6193F80700}" type="datetimeFigureOut">
               <a:rPr lang="en-NL" smtClean="0"/>
-              <a:t>01/03/2021</a:t>
+              <a:t>09/03/2021</a:t>
             </a:fld>
             <a:endParaRPr lang="en-NL"/>
           </a:p>
@@ -3755,7 +3755,7 @@
           <a:p>
             <a:fld id="{705B85CB-7326-4CDB-B6DC-66899E5F8844}" type="datetimeFigureOut">
               <a:rPr lang="nl-NL" smtClean="0"/>
-              <a:t>1-3-2021</a:t>
+              <a:t>9-3-2021</a:t>
             </a:fld>
             <a:endParaRPr lang="nl-NL"/>
           </a:p>
@@ -3955,7 +3955,7 @@
           <a:p>
             <a:fld id="{705B85CB-7326-4CDB-B6DC-66899E5F8844}" type="datetimeFigureOut">
               <a:rPr lang="nl-NL" smtClean="0"/>
-              <a:t>1-3-2021</a:t>
+              <a:t>9-3-2021</a:t>
             </a:fld>
             <a:endParaRPr lang="nl-NL"/>
           </a:p>
@@ -4165,7 +4165,7 @@
           <a:p>
             <a:fld id="{705B85CB-7326-4CDB-B6DC-66899E5F8844}" type="datetimeFigureOut">
               <a:rPr lang="nl-NL" smtClean="0"/>
-              <a:t>1-3-2021</a:t>
+              <a:t>9-3-2021</a:t>
             </a:fld>
             <a:endParaRPr lang="nl-NL"/>
           </a:p>
@@ -4441,7 +4441,7 @@
           <a:p>
             <a:fld id="{766785BB-7706-4DEE-A3EF-8F6193F80700}" type="datetimeFigureOut">
               <a:rPr lang="en-NL" smtClean="0"/>
-              <a:t>01/03/2021</a:t>
+              <a:t>09/03/2021</a:t>
             </a:fld>
             <a:endParaRPr lang="en-NL"/>
           </a:p>
@@ -4709,7 +4709,7 @@
           <a:p>
             <a:fld id="{766785BB-7706-4DEE-A3EF-8F6193F80700}" type="datetimeFigureOut">
               <a:rPr lang="en-NL" smtClean="0"/>
-              <a:t>01/03/2021</a:t>
+              <a:t>09/03/2021</a:t>
             </a:fld>
             <a:endParaRPr lang="en-NL"/>
           </a:p>
@@ -5124,7 +5124,7 @@
           <a:p>
             <a:fld id="{766785BB-7706-4DEE-A3EF-8F6193F80700}" type="datetimeFigureOut">
               <a:rPr lang="en-NL" smtClean="0"/>
-              <a:t>01/03/2021</a:t>
+              <a:t>09/03/2021</a:t>
             </a:fld>
             <a:endParaRPr lang="en-NL"/>
           </a:p>
@@ -5266,7 +5266,7 @@
           <a:p>
             <a:fld id="{766785BB-7706-4DEE-A3EF-8F6193F80700}" type="datetimeFigureOut">
               <a:rPr lang="en-NL" smtClean="0"/>
-              <a:t>01/03/2021</a:t>
+              <a:t>09/03/2021</a:t>
             </a:fld>
             <a:endParaRPr lang="en-NL"/>
           </a:p>
@@ -5379,7 +5379,7 @@
           <a:p>
             <a:fld id="{766785BB-7706-4DEE-A3EF-8F6193F80700}" type="datetimeFigureOut">
               <a:rPr lang="en-NL" smtClean="0"/>
-              <a:t>01/03/2021</a:t>
+              <a:t>09/03/2021</a:t>
             </a:fld>
             <a:endParaRPr lang="en-NL"/>
           </a:p>
@@ -5692,7 +5692,7 @@
           <a:p>
             <a:fld id="{766785BB-7706-4DEE-A3EF-8F6193F80700}" type="datetimeFigureOut">
               <a:rPr lang="en-NL" smtClean="0"/>
-              <a:t>01/03/2021</a:t>
+              <a:t>09/03/2021</a:t>
             </a:fld>
             <a:endParaRPr lang="en-NL"/>
           </a:p>
@@ -5981,7 +5981,7 @@
           <a:p>
             <a:fld id="{766785BB-7706-4DEE-A3EF-8F6193F80700}" type="datetimeFigureOut">
               <a:rPr lang="en-NL" smtClean="0"/>
-              <a:t>01/03/2021</a:t>
+              <a:t>09/03/2021</a:t>
             </a:fld>
             <a:endParaRPr lang="en-NL"/>
           </a:p>
@@ -6224,7 +6224,7 @@
           <a:p>
             <a:fld id="{766785BB-7706-4DEE-A3EF-8F6193F80700}" type="datetimeFigureOut">
               <a:rPr lang="en-NL" smtClean="0"/>
-              <a:t>01/03/2021</a:t>
+              <a:t>09/03/2021</a:t>
             </a:fld>
             <a:endParaRPr lang="en-NL"/>
           </a:p>
@@ -6794,7 +6794,7 @@
           <a:p>
             <a:fld id="{705B85CB-7326-4CDB-B6DC-66899E5F8844}" type="datetimeFigureOut">
               <a:rPr lang="nl-NL" smtClean="0"/>
-              <a:t>1-3-2021</a:t>
+              <a:t>9-3-2021</a:t>
             </a:fld>
             <a:endParaRPr lang="nl-NL"/>
           </a:p>
@@ -16188,7 +16188,7 @@
         <p:spPr>
           <a:xfrm>
             <a:off x="2095099" y="385011"/>
-            <a:ext cx="8001802" cy="6179418"/>
+            <a:ext cx="8189804" cy="6179418"/>
           </a:xfrm>
           <a:prstGeom prst="rect">
             <a:avLst/>
@@ -19472,8 +19472,8 @@
         </p:nvSpPr>
         <p:spPr>
           <a:xfrm>
-            <a:off x="2928010" y="5821168"/>
-            <a:ext cx="5591933" cy="572516"/>
+            <a:off x="2630364" y="5821168"/>
+            <a:ext cx="7036027" cy="572516"/>
           </a:xfrm>
           <a:prstGeom prst="roundRect">
             <a:avLst/>
@@ -19543,7 +19543,7 @@
         </p:nvSpPr>
         <p:spPr>
           <a:xfrm>
-            <a:off x="3111098" y="5903651"/>
+            <a:off x="2813452" y="5903651"/>
             <a:ext cx="173366" cy="173366"/>
           </a:xfrm>
           <a:prstGeom prst="ellipse">
@@ -19622,7 +19622,7 @@
         </p:nvSpPr>
         <p:spPr>
           <a:xfrm>
-            <a:off x="4944881" y="5903651"/>
+            <a:off x="4647235" y="5903651"/>
             <a:ext cx="173366" cy="173366"/>
           </a:xfrm>
           <a:prstGeom prst="ellipse">
@@ -19701,7 +19701,7 @@
         </p:nvSpPr>
         <p:spPr>
           <a:xfrm>
-            <a:off x="3284463" y="5859529"/>
+            <a:off x="2986817" y="5859529"/>
             <a:ext cx="1331965" cy="261610"/>
           </a:xfrm>
           <a:prstGeom prst="rect">
@@ -19788,7 +19788,7 @@
         </p:nvSpPr>
         <p:spPr>
           <a:xfrm>
-            <a:off x="5101833" y="5859529"/>
+            <a:off x="4804187" y="5859529"/>
             <a:ext cx="1331966" cy="261610"/>
           </a:xfrm>
           <a:prstGeom prst="rect">
@@ -19861,7 +19861,7 @@
         </p:nvSpPr>
         <p:spPr>
           <a:xfrm>
-            <a:off x="6794322" y="5903651"/>
+            <a:off x="6496676" y="5903651"/>
             <a:ext cx="173366" cy="173366"/>
           </a:xfrm>
           <a:prstGeom prst="ellipse">
@@ -19934,7 +19934,7 @@
         </p:nvSpPr>
         <p:spPr>
           <a:xfrm>
-            <a:off x="6951519" y="5859529"/>
+            <a:off x="6653873" y="5859529"/>
             <a:ext cx="1460915" cy="261610"/>
           </a:xfrm>
           <a:prstGeom prst="rect">
@@ -20007,7 +20007,7 @@
         </p:nvSpPr>
         <p:spPr>
           <a:xfrm>
-            <a:off x="3284464" y="6103514"/>
+            <a:off x="2986818" y="6103514"/>
             <a:ext cx="1460915" cy="261610"/>
           </a:xfrm>
           <a:prstGeom prst="rect">
@@ -20108,7 +20108,7 @@
         </p:nvSpPr>
         <p:spPr>
           <a:xfrm>
-            <a:off x="3111098" y="6147636"/>
+            <a:off x="2813452" y="6147636"/>
             <a:ext cx="173366" cy="173366"/>
           </a:xfrm>
           <a:prstGeom prst="ellipse">
@@ -20181,7 +20181,7 @@
         </p:nvSpPr>
         <p:spPr>
           <a:xfrm>
-            <a:off x="5101833" y="6103514"/>
+            <a:off x="4804187" y="6103514"/>
             <a:ext cx="1460915" cy="261610"/>
           </a:xfrm>
           <a:prstGeom prst="rect">
@@ -20254,7 +20254,7 @@
         </p:nvSpPr>
         <p:spPr>
           <a:xfrm>
-            <a:off x="4944636" y="6147636"/>
+            <a:off x="4646990" y="6147636"/>
             <a:ext cx="173366" cy="173366"/>
           </a:xfrm>
           <a:prstGeom prst="ellipse">
@@ -21009,7 +21009,7 @@
         </p:nvSpPr>
         <p:spPr>
           <a:xfrm>
-            <a:off x="6951335" y="6103514"/>
+            <a:off x="6653689" y="6103514"/>
             <a:ext cx="1460915" cy="261610"/>
           </a:xfrm>
           <a:prstGeom prst="rect">
@@ -21096,7 +21096,7 @@
         </p:nvSpPr>
         <p:spPr>
           <a:xfrm>
-            <a:off x="6794138" y="6147636"/>
+            <a:off x="6496492" y="6147636"/>
             <a:ext cx="173366" cy="173366"/>
           </a:xfrm>
           <a:prstGeom prst="ellipse">
@@ -21707,6 +21707,225 @@
                 </a:solidFill>
               </a:rPr>
               <a:t>6</a:t>
+            </a:r>
+            <a:endParaRPr kumimoji="0" lang="en-US" sz="1050" b="0" i="0" u="none" strike="noStrike" kern="0" cap="none" spc="0" normalizeH="0" baseline="0" noProof="0" dirty="0">
+              <a:ln>
+                <a:noFill/>
+              </a:ln>
+              <a:solidFill>
+                <a:prstClr val="white"/>
+              </a:solidFill>
+              <a:effectLst/>
+              <a:uLnTx/>
+              <a:uFillTx/>
+            </a:endParaRPr>
+          </a:p>
+        </p:txBody>
+      </p:sp>
+      <p:sp>
+        <p:nvSpPr>
+          <p:cNvPr id="74" name="TextBox 73">
+            <a:extLst>
+              <a:ext uri="{FF2B5EF4-FFF2-40B4-BE49-F238E27FC236}">
+                <a16:creationId xmlns:a16="http://schemas.microsoft.com/office/drawing/2014/main" id="{CA92D50C-6462-4F09-AF9D-EE2164EC1193}"/>
+              </a:ext>
+            </a:extLst>
+          </p:cNvPr>
+          <p:cNvSpPr txBox="1"/>
+          <p:nvPr/>
+        </p:nvSpPr>
+        <p:spPr>
+          <a:xfrm>
+            <a:off x="8487023" y="5865138"/>
+            <a:ext cx="1006452" cy="261610"/>
+          </a:xfrm>
+          <a:prstGeom prst="rect">
+            <a:avLst/>
+          </a:prstGeom>
+          <a:noFill/>
+        </p:spPr>
+        <p:txBody>
+          <a:bodyPr wrap="square" rtlCol="0">
+            <a:spAutoFit/>
+          </a:bodyPr>
+          <a:lstStyle/>
+          <a:p>
+            <a:pPr marL="0" marR="0" lvl="0" indent="0" defTabSz="914400" eaLnBrk="1" fontAlgn="auto" latinLnBrk="0" hangingPunct="1">
+              <a:lnSpc>
+                <a:spcPct val="100000"/>
+              </a:lnSpc>
+              <a:spcBef>
+                <a:spcPts val="0"/>
+              </a:spcBef>
+              <a:spcAft>
+                <a:spcPts val="0"/>
+              </a:spcAft>
+              <a:buClrTx/>
+              <a:buSzTx/>
+              <a:buFontTx/>
+              <a:buNone/>
+              <a:tabLst/>
+              <a:defRPr/>
+            </a:pPr>
+            <a:r>
+              <a:rPr kumimoji="0" lang="nl-NL" sz="1100" b="0" i="0" u="none" strike="noStrike" kern="0" cap="none" spc="0" normalizeH="0" baseline="0" noProof="0" dirty="0">
+                <a:ln>
+                  <a:noFill/>
+                </a:ln>
+                <a:solidFill>
+                  <a:prstClr val="black"/>
+                </a:solidFill>
+                <a:effectLst/>
+                <a:uLnTx/>
+                <a:uFillTx/>
+              </a:rPr>
+              <a:t>Actors</a:t>
+            </a:r>
+            <a:endParaRPr kumimoji="0" lang="en-US" sz="1100" b="0" i="0" u="none" strike="noStrike" kern="0" cap="none" spc="0" normalizeH="0" baseline="0" noProof="0" dirty="0">
+              <a:ln>
+                <a:noFill/>
+              </a:ln>
+              <a:solidFill>
+                <a:prstClr val="black"/>
+              </a:solidFill>
+              <a:effectLst/>
+              <a:uLnTx/>
+              <a:uFillTx/>
+            </a:endParaRPr>
+          </a:p>
+        </p:txBody>
+      </p:sp>
+      <p:sp>
+        <p:nvSpPr>
+          <p:cNvPr id="76" name="Oval 75">
+            <a:extLst>
+              <a:ext uri="{FF2B5EF4-FFF2-40B4-BE49-F238E27FC236}">
+                <a16:creationId xmlns:a16="http://schemas.microsoft.com/office/drawing/2014/main" id="{244B3D0B-552F-4E59-B6F9-8B528C1C8669}"/>
+              </a:ext>
+            </a:extLst>
+          </p:cNvPr>
+          <p:cNvSpPr/>
+          <p:nvPr/>
+        </p:nvSpPr>
+        <p:spPr>
+          <a:xfrm>
+            <a:off x="8329825" y="5909260"/>
+            <a:ext cx="173366" cy="173366"/>
+          </a:xfrm>
+          <a:prstGeom prst="ellipse">
+            <a:avLst/>
+          </a:prstGeom>
+          <a:solidFill>
+            <a:sysClr val="windowText" lastClr="000000"/>
+          </a:solidFill>
+          <a:ln w="12700" cap="flat" cmpd="sng" algn="ctr">
+            <a:noFill/>
+            <a:prstDash val="solid"/>
+            <a:miter lim="800000"/>
+          </a:ln>
+          <a:effectLst/>
+        </p:spPr>
+        <p:txBody>
+          <a:bodyPr rtlCol="0" anchor="ctr"/>
+          <a:lstStyle/>
+          <a:p>
+            <a:pPr marL="0" marR="0" lvl="0" indent="0" algn="ctr" defTabSz="914400" eaLnBrk="1" fontAlgn="auto" latinLnBrk="0" hangingPunct="1">
+              <a:lnSpc>
+                <a:spcPct val="100000"/>
+              </a:lnSpc>
+              <a:spcBef>
+                <a:spcPts val="0"/>
+              </a:spcBef>
+              <a:spcAft>
+                <a:spcPts val="0"/>
+              </a:spcAft>
+              <a:buClrTx/>
+              <a:buSzTx/>
+              <a:buFontTx/>
+              <a:buNone/>
+              <a:tabLst/>
+              <a:defRPr/>
+            </a:pPr>
+            <a:r>
+              <a:rPr lang="nl-NL" sz="1050" kern="0" noProof="0" dirty="0">
+                <a:solidFill>
+                  <a:prstClr val="white"/>
+                </a:solidFill>
+              </a:rPr>
+              <a:t>7</a:t>
+            </a:r>
+            <a:endParaRPr kumimoji="0" lang="en-US" sz="1050" b="0" i="0" u="none" strike="noStrike" kern="0" cap="none" spc="0" normalizeH="0" baseline="0" noProof="0" dirty="0">
+              <a:ln>
+                <a:noFill/>
+              </a:ln>
+              <a:solidFill>
+                <a:prstClr val="white"/>
+              </a:solidFill>
+              <a:effectLst/>
+              <a:uLnTx/>
+              <a:uFillTx/>
+            </a:endParaRPr>
+          </a:p>
+        </p:txBody>
+      </p:sp>
+      <p:sp>
+        <p:nvSpPr>
+          <p:cNvPr id="77" name="Oval 76">
+            <a:extLst>
+              <a:ext uri="{FF2B5EF4-FFF2-40B4-BE49-F238E27FC236}">
+                <a16:creationId xmlns:a16="http://schemas.microsoft.com/office/drawing/2014/main" id="{6B87DC33-8CFD-4817-8C2F-B82694329923}"/>
+              </a:ext>
+            </a:extLst>
+          </p:cNvPr>
+          <p:cNvSpPr/>
+          <p:nvPr/>
+        </p:nvSpPr>
+        <p:spPr>
+          <a:xfrm>
+            <a:off x="9666567" y="751226"/>
+            <a:ext cx="173366" cy="173366"/>
+          </a:xfrm>
+          <a:prstGeom prst="ellipse">
+            <a:avLst/>
+          </a:prstGeom>
+          <a:solidFill>
+            <a:sysClr val="windowText" lastClr="000000"/>
+          </a:solidFill>
+          <a:ln w="12700" cap="flat" cmpd="sng" algn="ctr">
+            <a:noFill/>
+            <a:prstDash val="solid"/>
+            <a:miter lim="800000"/>
+          </a:ln>
+          <a:effectLst/>
+        </p:spPr>
+        <p:txBody>
+          <a:bodyPr rtlCol="0" anchor="ctr"/>
+          <a:lstStyle/>
+          <a:p>
+            <a:pPr marL="0" marR="0" lvl="0" indent="0" algn="ctr" defTabSz="914400" eaLnBrk="1" fontAlgn="auto" latinLnBrk="0" hangingPunct="1">
+              <a:lnSpc>
+                <a:spcPct val="100000"/>
+              </a:lnSpc>
+              <a:spcBef>
+                <a:spcPts val="0"/>
+              </a:spcBef>
+              <a:spcAft>
+                <a:spcPts val="0"/>
+              </a:spcAft>
+              <a:buClrTx/>
+              <a:buSzTx/>
+              <a:buFontTx/>
+              <a:buNone/>
+              <a:tabLst/>
+              <a:defRPr/>
+            </a:pPr>
+            <a:r>
+              <a:rPr lang="nl-NL" sz="1050" kern="0" dirty="0">
+                <a:solidFill>
+                  <a:prstClr val="white"/>
+                </a:solidFill>
+              </a:rPr>
+              <a:t>7</a:t>
             </a:r>
             <a:endParaRPr kumimoji="0" lang="en-US" sz="1050" b="0" i="0" u="none" strike="noStrike" kern="0" cap="none" spc="0" normalizeH="0" baseline="0" noProof="0" dirty="0">
               <a:ln>
@@ -23744,6 +23963,129 @@
                                   </p:childTnLst>
                                 </p:cTn>
                               </p:par>
+                              <p:par>
+                                <p:cTn id="177" presetID="10" presetClass="entr" presetSubtype="0" fill="hold" grpId="0" nodeType="withEffect">
+                                  <p:stCondLst>
+                                    <p:cond delay="0"/>
+                                  </p:stCondLst>
+                                  <p:childTnLst>
+                                    <p:set>
+                                      <p:cBhvr>
+                                        <p:cTn id="178" dur="1" fill="hold">
+                                          <p:stCondLst>
+                                            <p:cond delay="0"/>
+                                          </p:stCondLst>
+                                        </p:cTn>
+                                        <p:tgtEl>
+                                          <p:spTgt spid="76"/>
+                                        </p:tgtEl>
+                                        <p:attrNameLst>
+                                          <p:attrName>style.visibility</p:attrName>
+                                        </p:attrNameLst>
+                                      </p:cBhvr>
+                                      <p:to>
+                                        <p:strVal val="visible"/>
+                                      </p:to>
+                                    </p:set>
+                                    <p:animEffect transition="in" filter="fade">
+                                      <p:cBhvr>
+                                        <p:cTn id="179" dur="500"/>
+                                        <p:tgtEl>
+                                          <p:spTgt spid="76"/>
+                                        </p:tgtEl>
+                                      </p:cBhvr>
+                                    </p:animEffect>
+                                  </p:childTnLst>
+                                </p:cTn>
+                              </p:par>
+                              <p:par>
+                                <p:cTn id="180" presetID="10" presetClass="entr" presetSubtype="0" fill="hold" grpId="0" nodeType="withEffect">
+                                  <p:stCondLst>
+                                    <p:cond delay="0"/>
+                                  </p:stCondLst>
+                                  <p:childTnLst>
+                                    <p:set>
+                                      <p:cBhvr>
+                                        <p:cTn id="181" dur="1" fill="hold">
+                                          <p:stCondLst>
+                                            <p:cond delay="0"/>
+                                          </p:stCondLst>
+                                        </p:cTn>
+                                        <p:tgtEl>
+                                          <p:spTgt spid="74"/>
+                                        </p:tgtEl>
+                                        <p:attrNameLst>
+                                          <p:attrName>style.visibility</p:attrName>
+                                        </p:attrNameLst>
+                                      </p:cBhvr>
+                                      <p:to>
+                                        <p:strVal val="visible"/>
+                                      </p:to>
+                                    </p:set>
+                                    <p:animEffect transition="in" filter="fade">
+                                      <p:cBhvr>
+                                        <p:cTn id="182" dur="500"/>
+                                        <p:tgtEl>
+                                          <p:spTgt spid="74"/>
+                                        </p:tgtEl>
+                                      </p:cBhvr>
+                                    </p:animEffect>
+                                  </p:childTnLst>
+                                </p:cTn>
+                              </p:par>
+                            </p:childTnLst>
+                          </p:cTn>
+                        </p:par>
+                      </p:childTnLst>
+                    </p:cTn>
+                  </p:par>
+                  <p:par>
+                    <p:cTn id="183" fill="hold">
+                      <p:stCondLst>
+                        <p:cond delay="indefinite"/>
+                      </p:stCondLst>
+                      <p:childTnLst>
+                        <p:par>
+                          <p:cTn id="184" fill="hold">
+                            <p:stCondLst>
+                              <p:cond delay="0"/>
+                            </p:stCondLst>
+                            <p:childTnLst>
+                              <p:par>
+                                <p:cTn id="185" presetID="10" presetClass="entr" presetSubtype="0" fill="hold" grpId="0" nodeType="clickEffect">
+                                  <p:stCondLst>
+                                    <p:cond delay="0"/>
+                                  </p:stCondLst>
+                                  <p:childTnLst>
+                                    <p:set>
+                                      <p:cBhvr>
+                                        <p:cTn id="186" dur="1" fill="hold">
+                                          <p:stCondLst>
+                                            <p:cond delay="0"/>
+                                          </p:stCondLst>
+                                        </p:cTn>
+                                        <p:tgtEl>
+                                          <p:spTgt spid="77"/>
+                                        </p:tgtEl>
+                                        <p:attrNameLst>
+                                          <p:attrName>style.visibility</p:attrName>
+                                        </p:attrNameLst>
+                                      </p:cBhvr>
+                                      <p:to>
+                                        <p:strVal val="visible"/>
+                                      </p:to>
+                                    </p:set>
+                                    <p:animEffect transition="in" filter="fade">
+                                      <p:cBhvr>
+                                        <p:cTn id="187" dur="500"/>
+                                        <p:tgtEl>
+                                          <p:spTgt spid="77"/>
+                                        </p:tgtEl>
+                                      </p:cBhvr>
+                                    </p:animEffect>
+                                  </p:childTnLst>
+                                </p:cTn>
+                              </p:par>
                             </p:childTnLst>
                           </p:cTn>
                         </p:par>
@@ -23810,6 +24152,9 @@
       <p:bldP spid="179" grpId="0" animBg="1"/>
       <p:bldP spid="84" grpId="0" animBg="1"/>
       <p:bldP spid="183" grpId="0" animBg="1"/>
+      <p:bldP spid="74" grpId="0"/>
+      <p:bldP spid="76" grpId="0" animBg="1"/>
+      <p:bldP spid="77" grpId="0" animBg="1"/>
     </p:bldLst>
   </p:timing>
 </p:sld>

</xml_diff>

<commit_message>
Upgrade to Dapr 1.2
</commit_message>
<xml_diff>
--- a/Figures.pptx
+++ b/Figures.pptx
@@ -202,7 +202,7 @@
           <a:p>
             <a:fld id="{FBE30875-4028-481A-8091-6EDB19798FA1}" type="datetimeFigureOut">
               <a:rPr lang="en-NL" smtClean="0"/>
-              <a:t>09/03/2021</a:t>
+              <a:t>18/04/2021</a:t>
             </a:fld>
             <a:endParaRPr lang="en-NL"/>
           </a:p>
@@ -907,7 +907,7 @@
           <a:p>
             <a:fld id="{766785BB-7706-4DEE-A3EF-8F6193F80700}" type="datetimeFigureOut">
               <a:rPr lang="en-NL" smtClean="0"/>
-              <a:t>09/03/2021</a:t>
+              <a:t>18/04/2021</a:t>
             </a:fld>
             <a:endParaRPr lang="en-NL"/>
           </a:p>
@@ -1107,7 +1107,7 @@
           <a:p>
             <a:fld id="{766785BB-7706-4DEE-A3EF-8F6193F80700}" type="datetimeFigureOut">
               <a:rPr lang="en-NL" smtClean="0"/>
-              <a:t>09/03/2021</a:t>
+              <a:t>18/04/2021</a:t>
             </a:fld>
             <a:endParaRPr lang="en-NL"/>
           </a:p>
@@ -1317,7 +1317,7 @@
           <a:p>
             <a:fld id="{766785BB-7706-4DEE-A3EF-8F6193F80700}" type="datetimeFigureOut">
               <a:rPr lang="en-NL" smtClean="0"/>
-              <a:t>09/03/2021</a:t>
+              <a:t>18/04/2021</a:t>
             </a:fld>
             <a:endParaRPr lang="en-NL"/>
           </a:p>
@@ -1539,7 +1539,7 @@
           <a:p>
             <a:fld id="{705B85CB-7326-4CDB-B6DC-66899E5F8844}" type="datetimeFigureOut">
               <a:rPr lang="nl-NL" smtClean="0"/>
-              <a:t>9-3-2021</a:t>
+              <a:t>18-4-2021</a:t>
             </a:fld>
             <a:endParaRPr lang="nl-NL"/>
           </a:p>
@@ -1739,7 +1739,7 @@
           <a:p>
             <a:fld id="{705B85CB-7326-4CDB-B6DC-66899E5F8844}" type="datetimeFigureOut">
               <a:rPr lang="nl-NL" smtClean="0"/>
-              <a:t>9-3-2021</a:t>
+              <a:t>18-4-2021</a:t>
             </a:fld>
             <a:endParaRPr lang="nl-NL"/>
           </a:p>
@@ -2015,7 +2015,7 @@
           <a:p>
             <a:fld id="{705B85CB-7326-4CDB-B6DC-66899E5F8844}" type="datetimeFigureOut">
               <a:rPr lang="nl-NL" smtClean="0"/>
-              <a:t>9-3-2021</a:t>
+              <a:t>18-4-2021</a:t>
             </a:fld>
             <a:endParaRPr lang="nl-NL"/>
           </a:p>
@@ -2283,7 +2283,7 @@
           <a:p>
             <a:fld id="{705B85CB-7326-4CDB-B6DC-66899E5F8844}" type="datetimeFigureOut">
               <a:rPr lang="nl-NL" smtClean="0"/>
-              <a:t>9-3-2021</a:t>
+              <a:t>18-4-2021</a:t>
             </a:fld>
             <a:endParaRPr lang="nl-NL"/>
           </a:p>
@@ -2698,7 +2698,7 @@
           <a:p>
             <a:fld id="{705B85CB-7326-4CDB-B6DC-66899E5F8844}" type="datetimeFigureOut">
               <a:rPr lang="nl-NL" smtClean="0"/>
-              <a:t>9-3-2021</a:t>
+              <a:t>18-4-2021</a:t>
             </a:fld>
             <a:endParaRPr lang="nl-NL"/>
           </a:p>
@@ -2840,7 +2840,7 @@
           <a:p>
             <a:fld id="{705B85CB-7326-4CDB-B6DC-66899E5F8844}" type="datetimeFigureOut">
               <a:rPr lang="nl-NL" smtClean="0"/>
-              <a:t>9-3-2021</a:t>
+              <a:t>18-4-2021</a:t>
             </a:fld>
             <a:endParaRPr lang="nl-NL"/>
           </a:p>
@@ -2953,7 +2953,7 @@
           <a:p>
             <a:fld id="{705B85CB-7326-4CDB-B6DC-66899E5F8844}" type="datetimeFigureOut">
               <a:rPr lang="nl-NL" smtClean="0"/>
-              <a:t>9-3-2021</a:t>
+              <a:t>18-4-2021</a:t>
             </a:fld>
             <a:endParaRPr lang="nl-NL"/>
           </a:p>
@@ -3266,7 +3266,7 @@
           <a:p>
             <a:fld id="{705B85CB-7326-4CDB-B6DC-66899E5F8844}" type="datetimeFigureOut">
               <a:rPr lang="nl-NL" smtClean="0"/>
-              <a:t>9-3-2021</a:t>
+              <a:t>18-4-2021</a:t>
             </a:fld>
             <a:endParaRPr lang="nl-NL"/>
           </a:p>
@@ -3466,7 +3466,7 @@
           <a:p>
             <a:fld id="{766785BB-7706-4DEE-A3EF-8F6193F80700}" type="datetimeFigureOut">
               <a:rPr lang="en-NL" smtClean="0"/>
-              <a:t>09/03/2021</a:t>
+              <a:t>18/04/2021</a:t>
             </a:fld>
             <a:endParaRPr lang="en-NL"/>
           </a:p>
@@ -3755,7 +3755,7 @@
           <a:p>
             <a:fld id="{705B85CB-7326-4CDB-B6DC-66899E5F8844}" type="datetimeFigureOut">
               <a:rPr lang="nl-NL" smtClean="0"/>
-              <a:t>9-3-2021</a:t>
+              <a:t>18-4-2021</a:t>
             </a:fld>
             <a:endParaRPr lang="nl-NL"/>
           </a:p>
@@ -3955,7 +3955,7 @@
           <a:p>
             <a:fld id="{705B85CB-7326-4CDB-B6DC-66899E5F8844}" type="datetimeFigureOut">
               <a:rPr lang="nl-NL" smtClean="0"/>
-              <a:t>9-3-2021</a:t>
+              <a:t>18-4-2021</a:t>
             </a:fld>
             <a:endParaRPr lang="nl-NL"/>
           </a:p>
@@ -4165,7 +4165,7 @@
           <a:p>
             <a:fld id="{705B85CB-7326-4CDB-B6DC-66899E5F8844}" type="datetimeFigureOut">
               <a:rPr lang="nl-NL" smtClean="0"/>
-              <a:t>9-3-2021</a:t>
+              <a:t>18-4-2021</a:t>
             </a:fld>
             <a:endParaRPr lang="nl-NL"/>
           </a:p>
@@ -4441,7 +4441,7 @@
           <a:p>
             <a:fld id="{766785BB-7706-4DEE-A3EF-8F6193F80700}" type="datetimeFigureOut">
               <a:rPr lang="en-NL" smtClean="0"/>
-              <a:t>09/03/2021</a:t>
+              <a:t>18/04/2021</a:t>
             </a:fld>
             <a:endParaRPr lang="en-NL"/>
           </a:p>
@@ -4709,7 +4709,7 @@
           <a:p>
             <a:fld id="{766785BB-7706-4DEE-A3EF-8F6193F80700}" type="datetimeFigureOut">
               <a:rPr lang="en-NL" smtClean="0"/>
-              <a:t>09/03/2021</a:t>
+              <a:t>18/04/2021</a:t>
             </a:fld>
             <a:endParaRPr lang="en-NL"/>
           </a:p>
@@ -5124,7 +5124,7 @@
           <a:p>
             <a:fld id="{766785BB-7706-4DEE-A3EF-8F6193F80700}" type="datetimeFigureOut">
               <a:rPr lang="en-NL" smtClean="0"/>
-              <a:t>09/03/2021</a:t>
+              <a:t>18/04/2021</a:t>
             </a:fld>
             <a:endParaRPr lang="en-NL"/>
           </a:p>
@@ -5266,7 +5266,7 @@
           <a:p>
             <a:fld id="{766785BB-7706-4DEE-A3EF-8F6193F80700}" type="datetimeFigureOut">
               <a:rPr lang="en-NL" smtClean="0"/>
-              <a:t>09/03/2021</a:t>
+              <a:t>18/04/2021</a:t>
             </a:fld>
             <a:endParaRPr lang="en-NL"/>
           </a:p>
@@ -5379,7 +5379,7 @@
           <a:p>
             <a:fld id="{766785BB-7706-4DEE-A3EF-8F6193F80700}" type="datetimeFigureOut">
               <a:rPr lang="en-NL" smtClean="0"/>
-              <a:t>09/03/2021</a:t>
+              <a:t>18/04/2021</a:t>
             </a:fld>
             <a:endParaRPr lang="en-NL"/>
           </a:p>
@@ -5692,7 +5692,7 @@
           <a:p>
             <a:fld id="{766785BB-7706-4DEE-A3EF-8F6193F80700}" type="datetimeFigureOut">
               <a:rPr lang="en-NL" smtClean="0"/>
-              <a:t>09/03/2021</a:t>
+              <a:t>18/04/2021</a:t>
             </a:fld>
             <a:endParaRPr lang="en-NL"/>
           </a:p>
@@ -5981,7 +5981,7 @@
           <a:p>
             <a:fld id="{766785BB-7706-4DEE-A3EF-8F6193F80700}" type="datetimeFigureOut">
               <a:rPr lang="en-NL" smtClean="0"/>
-              <a:t>09/03/2021</a:t>
+              <a:t>18/04/2021</a:t>
             </a:fld>
             <a:endParaRPr lang="en-NL"/>
           </a:p>
@@ -6224,7 +6224,7 @@
           <a:p>
             <a:fld id="{766785BB-7706-4DEE-A3EF-8F6193F80700}" type="datetimeFigureOut">
               <a:rPr lang="en-NL" smtClean="0"/>
-              <a:t>09/03/2021</a:t>
+              <a:t>18/04/2021</a:t>
             </a:fld>
             <a:endParaRPr lang="en-NL"/>
           </a:p>
@@ -6794,7 +6794,7 @@
           <a:p>
             <a:fld id="{705B85CB-7326-4CDB-B6DC-66899E5F8844}" type="datetimeFigureOut">
               <a:rPr lang="nl-NL" smtClean="0"/>
-              <a:t>9-3-2021</a:t>
+              <a:t>18-4-2021</a:t>
             </a:fld>
             <a:endParaRPr lang="nl-NL"/>
           </a:p>
@@ -29225,7 +29225,6 @@
         </p:nvPicPr>
         <p:blipFill rotWithShape="1">
           <a:blip r:embed="rId5">
-            <a:biLevel thresh="25000"/>
             <a:extLst>
               <a:ext uri="{28A0092B-C50C-407E-A947-70E740481C1C}">
                 <a14:useLocalDpi xmlns:a14="http://schemas.microsoft.com/office/drawing/2010/main" val="0"/>

</xml_diff>